<commit_message>
Alterações no desenho de arquitetura
</commit_message>
<xml_diff>
--- a/Documentação/Desenho de arquitetura de software.pptx
+++ b/Documentação/Desenho de arquitetura de software.pptx
@@ -6598,7 +6598,7 @@
           <a:p>
             <a:fld id="{59DFAF6B-3E96-4408-B623-B0A75E7457D9}" type="datetimeFigureOut">
               <a:rPr lang="en-US" smtClean="0"/>
-              <a:t>4/11/2022</a:t>
+              <a:t>4/16/2022</a:t>
             </a:fld>
             <a:endParaRPr lang="en-US"/>
           </a:p>
@@ -18440,6 +18440,42 @@
           </a:fontRef>
         </p:style>
       </p:cxnSp>
+      <p:pic>
+        <p:nvPicPr>
+          <p:cNvPr id="5" name="Imagem 4" descr="Diagrama&#10;&#10;Descrição gerada automaticamente">
+            <a:extLst>
+              <a:ext uri="{FF2B5EF4-FFF2-40B4-BE49-F238E27FC236}">
+                <a16:creationId xmlns:a16="http://schemas.microsoft.com/office/drawing/2014/main" id="{17411F04-4268-46DA-953F-E3A948A70317}"/>
+              </a:ext>
+            </a:extLst>
+          </p:cNvPr>
+          <p:cNvPicPr>
+            <a:picLocks noChangeAspect="1"/>
+          </p:cNvPicPr>
+          <p:nvPr/>
+        </p:nvPicPr>
+        <p:blipFill>
+          <a:blip r:embed="rId3">
+            <a:extLst>
+              <a:ext uri="{28A0092B-C50C-407E-A947-70E740481C1C}">
+                <a14:useLocalDpi xmlns:a14="http://schemas.microsoft.com/office/drawing/2010/main" val="0"/>
+              </a:ext>
+            </a:extLst>
+          </a:blip>
+          <a:stretch>
+            <a:fillRect/>
+          </a:stretch>
+        </p:blipFill>
+        <p:spPr>
+          <a:xfrm>
+            <a:off x="-7220" y="0"/>
+            <a:ext cx="12206440" cy="6858000"/>
+          </a:xfrm>
+          <a:prstGeom prst="rect">
+            <a:avLst/>
+          </a:prstGeom>
+        </p:spPr>
+      </p:pic>
     </p:spTree>
     <p:extLst>
       <p:ext uri="{BB962C8B-B14F-4D97-AF65-F5344CB8AC3E}">
@@ -18950,6 +18986,21 @@
 </file>
 
 <file path=customXml/item1.xml><?xml version="1.0" encoding="utf-8"?>
+<?mso-contentType ?>
+<FormTemplates xmlns="http://schemas.microsoft.com/sharepoint/v3/contenttype/forms">
+  <Display>DocumentLibraryForm</Display>
+  <Edit>DocumentLibraryForm</Edit>
+  <New>DocumentLibraryForm</New>
+</FormTemplates>
+</file>
+
+<file path=customXml/item2.xml><?xml version="1.0" encoding="utf-8"?>
+<p:properties xmlns:p="http://schemas.microsoft.com/office/2006/metadata/properties" xmlns:xsi="http://www.w3.org/2001/XMLSchema-instance" xmlns:pc="http://schemas.microsoft.com/office/infopath/2007/PartnerControls">
+  <documentManagement/>
+</p:properties>
+</file>
+
+<file path=customXml/item3.xml><?xml version="1.0" encoding="utf-8"?>
 <ct:contentTypeSchema xmlns:ct="http://schemas.microsoft.com/office/2006/metadata/contentType" xmlns:ma="http://schemas.microsoft.com/office/2006/metadata/properties/metaAttributes" ct:_="" ma:_="" ma:contentTypeName="Documento" ma:contentTypeID="0x010100A0731E8D1374834C8E89AE093B47FB16" ma:contentTypeVersion="4" ma:contentTypeDescription="Crie um novo documento." ma:contentTypeScope="" ma:versionID="4837e8b0590f4bdf6c36e45dd83967a9">
   <xsd:schema xmlns:xsd="http://www.w3.org/2001/XMLSchema" xmlns:xs="http://www.w3.org/2001/XMLSchema" xmlns:p="http://schemas.microsoft.com/office/2006/metadata/properties" xmlns:ns2="8d73c667-0e32-466c-9097-a1f484c201cc" targetNamespace="http://schemas.microsoft.com/office/2006/metadata/properties" ma:root="true" ma:fieldsID="2b1d107c167b6255f3e6c6b90367b717" ns2:_="">
     <xsd:import namespace="8d73c667-0e32-466c-9097-a1f484c201cc"/>
@@ -19095,35 +19146,10 @@
 </ct:contentTypeSchema>
 </file>
 
-<file path=customXml/item2.xml><?xml version="1.0" encoding="utf-8"?>
-<p:properties xmlns:p="http://schemas.microsoft.com/office/2006/metadata/properties" xmlns:xsi="http://www.w3.org/2001/XMLSchema-instance" xmlns:pc="http://schemas.microsoft.com/office/infopath/2007/PartnerControls">
-  <documentManagement/>
-</p:properties>
-</file>
-
-<file path=customXml/item3.xml><?xml version="1.0" encoding="utf-8"?>
-<?mso-contentType ?>
-<FormTemplates xmlns="http://schemas.microsoft.com/sharepoint/v3/contenttype/forms">
-  <Display>DocumentLibraryForm</Display>
-  <Edit>DocumentLibraryForm</Edit>
-  <New>DocumentLibraryForm</New>
-</FormTemplates>
-</file>
-
 <file path=customXml/itemProps1.xml><?xml version="1.0" encoding="utf-8"?>
-<ds:datastoreItem xmlns:ds="http://schemas.openxmlformats.org/officeDocument/2006/customXml" ds:itemID="{C77A63D9-D020-4140-8B2F-EC8E663DD653}">
+<ds:datastoreItem xmlns:ds="http://schemas.openxmlformats.org/officeDocument/2006/customXml" ds:itemID="{7B7E5500-1E1C-4DD3-A9B7-CDF199E77632}">
   <ds:schemaRefs>
-    <ds:schemaRef ds:uri="http://schemas.microsoft.com/office/2006/metadata/contentType"/>
-    <ds:schemaRef ds:uri="http://schemas.microsoft.com/office/2006/metadata/properties/metaAttributes"/>
-    <ds:schemaRef ds:uri="http://www.w3.org/2001/XMLSchema"/>
-    <ds:schemaRef ds:uri="http://schemas.microsoft.com/office/2006/metadata/properties"/>
-    <ds:schemaRef ds:uri="8d73c667-0e32-466c-9097-a1f484c201cc"/>
-    <ds:schemaRef ds:uri="http://schemas.microsoft.com/office/2006/documentManagement/types"/>
-    <ds:schemaRef ds:uri="http://schemas.microsoft.com/office/infopath/2007/PartnerControls"/>
-    <ds:schemaRef ds:uri="http://schemas.openxmlformats.org/package/2006/metadata/core-properties"/>
-    <ds:schemaRef ds:uri="http://purl.org/dc/elements/1.1/"/>
-    <ds:schemaRef ds:uri="http://purl.org/dc/terms/"/>
-    <ds:schemaRef ds:uri="http://schemas.microsoft.com/internal/obd"/>
+    <ds:schemaRef ds:uri="http://schemas.microsoft.com/sharepoint/v3/contenttype/forms"/>
   </ds:schemaRefs>
 </ds:datastoreItem>
 </file>
@@ -19145,9 +19171,19 @@
 </file>
 
 <file path=customXml/itemProps3.xml><?xml version="1.0" encoding="utf-8"?>
-<ds:datastoreItem xmlns:ds="http://schemas.openxmlformats.org/officeDocument/2006/customXml" ds:itemID="{7B7E5500-1E1C-4DD3-A9B7-CDF199E77632}">
+<ds:datastoreItem xmlns:ds="http://schemas.openxmlformats.org/officeDocument/2006/customXml" ds:itemID="{C77A63D9-D020-4140-8B2F-EC8E663DD653}">
   <ds:schemaRefs>
-    <ds:schemaRef ds:uri="http://schemas.microsoft.com/sharepoint/v3/contenttype/forms"/>
+    <ds:schemaRef ds:uri="http://schemas.microsoft.com/office/2006/metadata/contentType"/>
+    <ds:schemaRef ds:uri="http://schemas.microsoft.com/office/2006/metadata/properties/metaAttributes"/>
+    <ds:schemaRef ds:uri="http://www.w3.org/2001/XMLSchema"/>
+    <ds:schemaRef ds:uri="http://schemas.microsoft.com/office/2006/metadata/properties"/>
+    <ds:schemaRef ds:uri="8d73c667-0e32-466c-9097-a1f484c201cc"/>
+    <ds:schemaRef ds:uri="http://schemas.microsoft.com/office/2006/documentManagement/types"/>
+    <ds:schemaRef ds:uri="http://schemas.microsoft.com/office/infopath/2007/PartnerControls"/>
+    <ds:schemaRef ds:uri="http://schemas.openxmlformats.org/package/2006/metadata/core-properties"/>
+    <ds:schemaRef ds:uri="http://purl.org/dc/elements/1.1/"/>
+    <ds:schemaRef ds:uri="http://purl.org/dc/terms/"/>
+    <ds:schemaRef ds:uri="http://schemas.microsoft.com/internal/obd"/>
   </ds:schemaRefs>
 </ds:datastoreItem>
 </file>
</xml_diff>